<commit_message>
[What] If user confirm the order, and the DB did not updated. [How] Update the DB after user click the confirm button.
</commit_message>
<xml_diff>
--- a/DingoLin_Web.pptx
+++ b/DingoLin_Web.pptx
@@ -305,7 +305,7 @@
               <a:pPr>
                 <a:defRPr/>
               </a:pPr>
-              <a:t>2/1/2018</a:t>
+              <a:t>2/2/2018</a:t>
             </a:fld>
             <a:endParaRPr lang="en-US"/>
           </a:p>
@@ -528,7 +528,7 @@
               <a:pPr>
                 <a:defRPr/>
               </a:pPr>
-              <a:t>2/1/2018</a:t>
+              <a:t>2/2/2018</a:t>
             </a:fld>
             <a:endParaRPr lang="en-US"/>
           </a:p>
@@ -1456,11 +1456,7 @@
             </a:r>
             <a:r>
               <a:rPr lang="zh-TW" altLang="en-US" dirty="0" smtClean="0"/>
-              <a:t>在做，所以會</a:t>
-            </a:r>
-            <a:r>
-              <a:rPr lang="zh-TW" altLang="en-US" dirty="0" smtClean="0"/>
-              <a:t>相容</a:t>
+              <a:t>在做，所以會相容</a:t>
             </a:r>
             <a:r>
               <a:rPr lang="en-US" altLang="zh-TW" dirty="0" smtClean="0"/>
@@ -4893,18 +4889,33 @@
             <a:pPr lvl="1"/>
             <a:r>
               <a:rPr lang="en-US" altLang="zh-TW" dirty="0" smtClean="0"/>
+              <a:t>Date</a:t>
+            </a:r>
+          </a:p>
+          <a:p>
+            <a:pPr lvl="1"/>
+            <a:r>
+              <a:rPr lang="en-US" altLang="zh-TW" dirty="0" err="1" smtClean="0"/>
+              <a:t>OrderList</a:t>
+            </a:r>
+            <a:endParaRPr lang="en-US" altLang="zh-TW" dirty="0" smtClean="0"/>
+          </a:p>
+          <a:p>
+            <a:pPr lvl="2"/>
+            <a:r>
+              <a:rPr lang="en-US" altLang="zh-TW" dirty="0" smtClean="0"/>
               <a:t>Dingo</a:t>
             </a:r>
           </a:p>
           <a:p>
-            <a:pPr lvl="2"/>
+            <a:pPr lvl="3"/>
             <a:r>
               <a:rPr lang="en-US" altLang="zh-TW" dirty="0" smtClean="0"/>
               <a:t>Food1</a:t>
             </a:r>
           </a:p>
           <a:p>
-            <a:pPr lvl="3"/>
+            <a:pPr lvl="4"/>
             <a:r>
               <a:rPr lang="zh-TW" altLang="en-US" dirty="0" smtClean="0"/>
               <a:t>數量</a:t>
@@ -4912,7 +4923,7 @@
             <a:endParaRPr lang="en-US" altLang="zh-TW" dirty="0" smtClean="0"/>
           </a:p>
           <a:p>
-            <a:pPr lvl="3"/>
+            <a:pPr lvl="4"/>
             <a:r>
               <a:rPr lang="zh-TW" altLang="en-US" dirty="0" smtClean="0"/>
               <a:t>數量</a:t>
@@ -4928,14 +4939,14 @@
             <a:endParaRPr lang="en-US" altLang="zh-TW" dirty="0" smtClean="0"/>
           </a:p>
           <a:p>
-            <a:pPr lvl="1"/>
+            <a:pPr lvl="2"/>
             <a:r>
               <a:rPr lang="en-US" altLang="zh-TW" dirty="0" smtClean="0"/>
               <a:t>Calvin</a:t>
             </a:r>
           </a:p>
           <a:p>
-            <a:pPr lvl="2"/>
+            <a:pPr lvl="3"/>
             <a:r>
               <a:rPr lang="en-US" altLang="zh-TW" dirty="0" smtClean="0"/>
               <a:t>…</a:t>
@@ -8939,6 +8950,15 @@
 </file>
 
 <file path=customXml/item1.xml><?xml version="1.0" encoding="utf-8"?>
+<?mso-contentType ?>
+<FormTemplates xmlns="http://schemas.microsoft.com/sharepoint/v3/contenttype/forms">
+  <Display>DocumentLibraryForm</Display>
+  <Edit>DocumentLibraryForm</Edit>
+  <New>DocumentLibraryForm</New>
+</FormTemplates>
+</file>
+
+<file path=customXml/item2.xml><?xml version="1.0" encoding="utf-8"?>
 <ct:contentTypeSchema xmlns:ct="http://schemas.microsoft.com/office/2006/metadata/contentType" xmlns:ma="http://schemas.microsoft.com/office/2006/metadata/properties/metaAttributes" ct:_="" ma:_="" ma:contentTypeName="Document" ma:contentTypeID="0x0101005847092691ECF746911CCF2475354880" ma:contentTypeVersion="0" ma:contentTypeDescription="Create a new document." ma:contentTypeScope="" ma:versionID="86d7f0d8287903eb0c1237e42191a0c3">
   <xsd:schema xmlns:xsd="http://www.w3.org/2001/XMLSchema" xmlns:p="http://schemas.microsoft.com/office/2006/metadata/properties" targetNamespace="http://schemas.microsoft.com/office/2006/metadata/properties" ma:root="true" ma:fieldsID="46ce51841bcaebe75ae25adb2fb3cbe1">
     <xsd:element name="properties">
@@ -8987,15 +9007,6 @@
 </ct:contentTypeSchema>
 </file>
 
-<file path=customXml/item2.xml><?xml version="1.0" encoding="utf-8"?>
-<?mso-contentType ?>
-<FormTemplates xmlns="http://schemas.microsoft.com/sharepoint/v3/contenttype/forms">
-  <Display>DocumentLibraryForm</Display>
-  <Edit>DocumentLibraryForm</Edit>
-  <New>DocumentLibraryForm</New>
-</FormTemplates>
-</file>
-
 <file path=customXml/item3.xml><?xml version="1.0" encoding="utf-8"?>
 <p:properties xmlns:p="http://schemas.microsoft.com/office/2006/metadata/properties" xmlns:xsi="http://www.w3.org/2001/XMLSchema-instance">
   <documentManagement/>
@@ -9003,6 +9014,14 @@
 </file>
 
 <file path=customXml/itemProps1.xml><?xml version="1.0" encoding="utf-8"?>
+<ds:datastoreItem xmlns:ds="http://schemas.openxmlformats.org/officeDocument/2006/customXml" ds:itemID="{7CE873EE-0851-4B57-9E97-B2C0756B5F78}">
+  <ds:schemaRefs>
+    <ds:schemaRef ds:uri="http://schemas.microsoft.com/sharepoint/v3/contenttype/forms"/>
+  </ds:schemaRefs>
+</ds:datastoreItem>
+</file>
+
+<file path=customXml/itemProps2.xml><?xml version="1.0" encoding="utf-8"?>
 <ds:datastoreItem xmlns:ds="http://schemas.openxmlformats.org/officeDocument/2006/customXml" ds:itemID="{56728B42-3A10-4745-A52F-DF039813A031}">
   <ds:schemaRefs>
     <ds:schemaRef ds:uri="http://schemas.microsoft.com/office/2006/metadata/contentType"/>
@@ -9013,14 +9032,6 @@
     <ds:schemaRef ds:uri="http://purl.org/dc/elements/1.1/"/>
     <ds:schemaRef ds:uri="http://purl.org/dc/terms/"/>
     <ds:schemaRef ds:uri="http://schemas.microsoft.com/office/internal/2005/internalDocumentation"/>
-  </ds:schemaRefs>
-</ds:datastoreItem>
-</file>
-
-<file path=customXml/itemProps2.xml><?xml version="1.0" encoding="utf-8"?>
-<ds:datastoreItem xmlns:ds="http://schemas.openxmlformats.org/officeDocument/2006/customXml" ds:itemID="{7CE873EE-0851-4B57-9E97-B2C0756B5F78}">
-  <ds:schemaRefs>
-    <ds:schemaRef ds:uri="http://schemas.microsoft.com/sharepoint/v3/contenttype/forms"/>
   </ds:schemaRefs>
 </ds:datastoreItem>
 </file>

</xml_diff>